<commit_message>
Updated presentations for lesson #6 and code style
</commit_message>
<xml_diff>
--- a/Presentation/code-style.pptx
+++ b/Presentation/code-style.pptx
@@ -5,14 +5,15 @@
     <p:sldMasterId id="2147483648" r:id="rId1"/>
   </p:sldMasterIdLst>
   <p:notesMasterIdLst>
-    <p:notesMasterId r:id="rId7"/>
+    <p:notesMasterId r:id="rId8"/>
   </p:notesMasterIdLst>
   <p:sldIdLst>
     <p:sldId id="256" r:id="rId2"/>
     <p:sldId id="257" r:id="rId3"/>
-    <p:sldId id="259" r:id="rId4"/>
-    <p:sldId id="260" r:id="rId5"/>
-    <p:sldId id="258" r:id="rId6"/>
+    <p:sldId id="261" r:id="rId4"/>
+    <p:sldId id="259" r:id="rId5"/>
+    <p:sldId id="260" r:id="rId6"/>
+    <p:sldId id="258" r:id="rId7"/>
   </p:sldIdLst>
   <p:sldSz cx="9144000" cy="6858000" type="screen4x3"/>
   <p:notesSz cx="6858000" cy="9144000"/>
@@ -3354,6 +3355,66 @@
             <p:ph type="title"/>
           </p:nvPr>
         </p:nvSpPr>
+        <p:spPr>
+          <a:xfrm>
+            <a:off x="457200" y="2857500"/>
+            <a:ext cx="8229600" cy="1143000"/>
+          </a:xfrm>
+        </p:spPr>
+        <p:txBody>
+          <a:bodyPr>
+            <a:normAutofit fontScale="90000"/>
+          </a:bodyPr>
+          <a:lstStyle/>
+          <a:p>
+            <a:r>
+              <a:rPr lang="ru-RU" dirty="0" smtClean="0"/>
+              <a:t>Код пишется для людей, а не для компьютера!</a:t>
+            </a:r>
+            <a:endParaRPr lang="ru-RU" dirty="0"/>
+          </a:p>
+        </p:txBody>
+      </p:sp>
+    </p:spTree>
+    <p:extLst>
+      <p:ext uri="{BB962C8B-B14F-4D97-AF65-F5344CB8AC3E}">
+        <p14:creationId xmlns:p14="http://schemas.microsoft.com/office/powerpoint/2010/main" val="1827939175"/>
+      </p:ext>
+    </p:extLst>
+  </p:cSld>
+  <p:clrMapOvr>
+    <a:masterClrMapping/>
+  </p:clrMapOvr>
+</p:sld>
+</file>
+
+<file path=ppt/slides/slide4.xml><?xml version="1.0" encoding="utf-8"?>
+<p:sld xmlns:a="http://schemas.openxmlformats.org/drawingml/2006/main" xmlns:r="http://schemas.openxmlformats.org/officeDocument/2006/relationships" xmlns:p="http://schemas.openxmlformats.org/presentationml/2006/main">
+  <p:cSld>
+    <p:spTree>
+      <p:nvGrpSpPr>
+        <p:cNvPr id="1" name=""/>
+        <p:cNvGrpSpPr/>
+        <p:nvPr/>
+      </p:nvGrpSpPr>
+      <p:grpSpPr>
+        <a:xfrm>
+          <a:off x="0" y="0"/>
+          <a:ext cx="0" cy="0"/>
+          <a:chOff x="0" y="0"/>
+          <a:chExt cx="0" cy="0"/>
+        </a:xfrm>
+      </p:grpSpPr>
+      <p:sp>
+        <p:nvSpPr>
+          <p:cNvPr id="2" name="Title 1"/>
+          <p:cNvSpPr>
+            <a:spLocks noGrp="1"/>
+          </p:cNvSpPr>
+          <p:nvPr>
+            <p:ph type="title"/>
+          </p:nvPr>
+        </p:nvSpPr>
         <p:spPr/>
         <p:txBody>
           <a:bodyPr/>
@@ -3489,7 +3550,33 @@
             </a:r>
             <a:r>
               <a:rPr lang="ru-RU" sz="1800" dirty="0" smtClean="0"/>
-              <a:t>Толковые комментарии</a:t>
+              <a:t>Толковые </a:t>
+            </a:r>
+            <a:r>
+              <a:rPr lang="ru-RU" sz="1800" dirty="0" smtClean="0"/>
+              <a:t>комментарии</a:t>
+            </a:r>
+            <a:endParaRPr lang="en-US" sz="1800" dirty="0" smtClean="0"/>
+          </a:p>
+          <a:p>
+            <a:pPr marL="0" indent="0">
+              <a:buNone/>
+            </a:pPr>
+            <a:r>
+              <a:rPr lang="ru-RU" sz="1800" dirty="0" smtClean="0"/>
+              <a:t>Использование </a:t>
+            </a:r>
+            <a:r>
+              <a:rPr lang="en-US" sz="1800" dirty="0" err="1" smtClean="0"/>
+              <a:t>var</a:t>
+            </a:r>
+            <a:r>
+              <a:rPr lang="en-US" sz="1800" dirty="0" smtClean="0"/>
+              <a:t> – </a:t>
+            </a:r>
+            <a:r>
+              <a:rPr lang="ru-RU" sz="1800" dirty="0" smtClean="0"/>
+              <a:t>где и почему</a:t>
             </a:r>
             <a:endParaRPr lang="en-US" sz="1800" dirty="0"/>
           </a:p>
@@ -3508,7 +3595,7 @@
 </p:sld>
 </file>
 
-<file path=ppt/slides/slide4.xml><?xml version="1.0" encoding="utf-8"?>
+<file path=ppt/slides/slide5.xml><?xml version="1.0" encoding="utf-8"?>
 <p:sld xmlns:a="http://schemas.openxmlformats.org/drawingml/2006/main" xmlns:r="http://schemas.openxmlformats.org/officeDocument/2006/relationships" xmlns:p="http://schemas.openxmlformats.org/presentationml/2006/main">
   <p:cSld>
     <p:spTree>
@@ -3538,7 +3625,7 @@
 </p:sld>
 </file>
 
-<file path=ppt/slides/slide5.xml><?xml version="1.0" encoding="utf-8"?>
+<file path=ppt/slides/slide6.xml><?xml version="1.0" encoding="utf-8"?>
 <p:sld xmlns:a="http://schemas.openxmlformats.org/drawingml/2006/main" xmlns:r="http://schemas.openxmlformats.org/officeDocument/2006/relationships" xmlns:p="http://schemas.openxmlformats.org/presentationml/2006/main">
   <p:cSld>
     <p:spTree>

</xml_diff>